<commit_message>
update remove user story diagram
</commit_message>
<xml_diff>
--- a/docs/diagrams/RemoveUserStoryFromSequenceDiagram.pptx
+++ b/docs/diagrams/RemoveUserStoryFromSequenceDiagram.pptx
@@ -3450,8 +3450,8 @@
         </p:nvSpPr>
         <p:spPr>
           <a:xfrm>
-            <a:off x="8632502" y="209845"/>
-            <a:ext cx="3469479" cy="5036037"/>
+            <a:off x="9147471" y="265100"/>
+            <a:ext cx="3469479" cy="5108402"/>
           </a:xfrm>
           <a:prstGeom prst="roundRect">
             <a:avLst>
@@ -3511,8 +3511,8 @@
         </p:nvSpPr>
         <p:spPr>
           <a:xfrm>
-            <a:off x="228600" y="163018"/>
-            <a:ext cx="8315184" cy="5129692"/>
+            <a:off x="-325223" y="203891"/>
+            <a:ext cx="9408895" cy="5129692"/>
           </a:xfrm>
           <a:prstGeom prst="roundRect">
             <a:avLst>
@@ -3788,9 +3788,9 @@
           <p:nvPr/>
         </p:nvCxnSpPr>
         <p:spPr>
-          <a:xfrm>
-            <a:off x="4050587" y="907617"/>
-            <a:ext cx="0" cy="1911783"/>
+          <a:xfrm flipH="1">
+            <a:off x="4048754" y="1020589"/>
+            <a:ext cx="27856" cy="2156206"/>
           </a:xfrm>
           <a:prstGeom prst="line">
             <a:avLst/>
@@ -3826,8 +3826,8 @@
         </p:nvSpPr>
         <p:spPr>
           <a:xfrm>
-            <a:off x="3957271" y="1365809"/>
-            <a:ext cx="207045" cy="1285073"/>
+            <a:off x="3957272" y="1365809"/>
+            <a:ext cx="181914" cy="1590287"/>
           </a:xfrm>
           <a:prstGeom prst="rect">
             <a:avLst/>
@@ -3880,7 +3880,7 @@
         </p:nvCxnSpPr>
         <p:spPr>
           <a:xfrm>
-            <a:off x="7728906" y="2105965"/>
+            <a:off x="7974475" y="2416595"/>
             <a:ext cx="0" cy="2644578"/>
           </a:xfrm>
           <a:prstGeom prst="line">
@@ -3917,7 +3917,7 @@
         </p:nvSpPr>
         <p:spPr>
           <a:xfrm>
-            <a:off x="7652706" y="2105965"/>
+            <a:off x="7898275" y="2416595"/>
             <a:ext cx="152400" cy="276003"/>
           </a:xfrm>
           <a:prstGeom prst="rect">
@@ -4029,13 +4029,15 @@
       <p:cxnSp>
         <p:nvCxnSpPr>
           <p:cNvPr id="28" name="Straight Arrow Connector 27"/>
-          <p:cNvCxnSpPr/>
+          <p:cNvCxnSpPr>
+            <a:cxnSpLocks/>
+          </p:cNvCxnSpPr>
           <p:nvPr/>
         </p:nvCxnSpPr>
         <p:spPr>
           <a:xfrm flipV="1">
-            <a:off x="4121714" y="1516963"/>
-            <a:ext cx="922392" cy="1"/>
+            <a:off x="4121714" y="1507650"/>
+            <a:ext cx="1699015" cy="9315"/>
           </a:xfrm>
           <a:prstGeom prst="straightConnector1">
             <a:avLst/>
@@ -4070,7 +4072,7 @@
         </p:nvSpPr>
         <p:spPr>
           <a:xfrm>
-            <a:off x="3166922" y="2956101"/>
+            <a:off x="4167312" y="2971854"/>
             <a:ext cx="855809" cy="215444"/>
           </a:xfrm>
           <a:prstGeom prst="rect">
@@ -4105,13 +4107,15 @@
       <p:cxnSp>
         <p:nvCxnSpPr>
           <p:cNvPr id="34" name="Straight Arrow Connector 33"/>
-          <p:cNvCxnSpPr/>
+          <p:cNvCxnSpPr>
+            <a:cxnSpLocks/>
+          </p:cNvCxnSpPr>
           <p:nvPr/>
         </p:nvCxnSpPr>
         <p:spPr>
           <a:xfrm>
-            <a:off x="4146325" y="2587233"/>
-            <a:ext cx="1492974" cy="0"/>
+            <a:off x="4146325" y="2819400"/>
+            <a:ext cx="2239461" cy="0"/>
           </a:xfrm>
           <a:prstGeom prst="straightConnector1">
             <a:avLst/>
@@ -4150,7 +4154,7 @@
         </p:nvCxnSpPr>
         <p:spPr>
           <a:xfrm>
-            <a:off x="1702520" y="2650882"/>
+            <a:off x="1660450" y="2952678"/>
             <a:ext cx="2348067" cy="0"/>
           </a:xfrm>
           <a:prstGeom prst="straightConnector1">
@@ -4226,7 +4230,7 @@
         </p:nvSpPr>
         <p:spPr>
           <a:xfrm>
-            <a:off x="7653312" y="3223645"/>
+            <a:off x="7881912" y="3223645"/>
             <a:ext cx="161322" cy="1307285"/>
           </a:xfrm>
           <a:prstGeom prst="rect">
@@ -4394,7 +4398,7 @@
         </p:nvSpPr>
         <p:spPr>
           <a:xfrm>
-            <a:off x="2724223" y="2353089"/>
+            <a:off x="2250420" y="2711579"/>
             <a:ext cx="925413" cy="215444"/>
           </a:xfrm>
           <a:prstGeom prst="rect">
@@ -4434,7 +4438,7 @@
         </p:nvSpPr>
         <p:spPr>
           <a:xfrm>
-            <a:off x="9597764" y="2819400"/>
+            <a:off x="9826364" y="2819400"/>
             <a:ext cx="841636" cy="300180"/>
           </a:xfrm>
           <a:prstGeom prst="rect">
@@ -4495,7 +4499,7 @@
         </p:nvCxnSpPr>
         <p:spPr>
           <a:xfrm flipH="1">
-            <a:off x="10034490" y="3110506"/>
+            <a:off x="10263090" y="3110506"/>
             <a:ext cx="3959" cy="1735710"/>
           </a:xfrm>
           <a:prstGeom prst="line">
@@ -4532,7 +4536,7 @@
         </p:nvSpPr>
         <p:spPr>
           <a:xfrm>
-            <a:off x="9935526" y="3415306"/>
+            <a:off x="10164126" y="3415306"/>
             <a:ext cx="168896" cy="775693"/>
           </a:xfrm>
           <a:prstGeom prst="rect">
@@ -4581,7 +4585,7 @@
         </p:nvCxnSpPr>
         <p:spPr>
           <a:xfrm>
-            <a:off x="7812579" y="3467676"/>
+            <a:off x="8041179" y="3467676"/>
             <a:ext cx="2122947" cy="0"/>
           </a:xfrm>
           <a:prstGeom prst="straightConnector1">
@@ -4617,7 +4621,7 @@
         </p:nvSpPr>
         <p:spPr>
           <a:xfrm>
-            <a:off x="6915573" y="1484104"/>
+            <a:off x="7098187" y="1802776"/>
             <a:ext cx="1814890" cy="649601"/>
           </a:xfrm>
           <a:prstGeom prst="rect">
@@ -4701,7 +4705,7 @@
         <p:spPr>
           <a:xfrm>
             <a:off x="1729295" y="3236192"/>
-            <a:ext cx="5916759" cy="13456"/>
+            <a:ext cx="6132804" cy="19175"/>
           </a:xfrm>
           <a:prstGeom prst="straightConnector1">
             <a:avLst/>
@@ -4789,7 +4793,7 @@
         <p:spPr>
           <a:xfrm>
             <a:off x="1743801" y="4549767"/>
-            <a:ext cx="5954056" cy="0"/>
+            <a:ext cx="6138111" cy="0"/>
           </a:xfrm>
           <a:prstGeom prst="straightConnector1">
             <a:avLst/>
@@ -4826,7 +4830,7 @@
         </p:nvSpPr>
         <p:spPr>
           <a:xfrm>
-            <a:off x="7858252" y="3082355"/>
+            <a:off x="8086852" y="3082355"/>
             <a:ext cx="1974796" cy="369332"/>
           </a:xfrm>
           <a:prstGeom prst="rect">
@@ -4879,7 +4883,7 @@
         </p:nvCxnSpPr>
         <p:spPr>
           <a:xfrm>
-            <a:off x="7823018" y="4190999"/>
+            <a:off x="8051618" y="4190999"/>
             <a:ext cx="2196956" cy="0"/>
           </a:xfrm>
           <a:prstGeom prst="straightConnector1">
@@ -4923,7 +4927,7 @@
         </p:nvSpPr>
         <p:spPr>
           <a:xfrm>
-            <a:off x="5589169" y="1524417"/>
+            <a:off x="6383706" y="1524417"/>
             <a:ext cx="152400" cy="276003"/>
           </a:xfrm>
           <a:prstGeom prst="rect">
@@ -4976,7 +4980,7 @@
         </p:nvSpPr>
         <p:spPr>
           <a:xfrm>
-            <a:off x="5054318" y="973756"/>
+            <a:off x="5848855" y="973756"/>
             <a:ext cx="1355506" cy="675353"/>
           </a:xfrm>
           <a:prstGeom prst="rect">
@@ -5054,7 +5058,7 @@
         </p:nvCxnSpPr>
         <p:spPr>
           <a:xfrm>
-            <a:off x="5665369" y="1565290"/>
+            <a:off x="6457783" y="1649109"/>
             <a:ext cx="0" cy="3387710"/>
           </a:xfrm>
           <a:prstGeom prst="line">
@@ -5097,7 +5101,7 @@
         </p:nvSpPr>
         <p:spPr>
           <a:xfrm>
-            <a:off x="5577510" y="1911884"/>
+            <a:off x="6375754" y="2163732"/>
             <a:ext cx="164059" cy="675349"/>
           </a:xfrm>
           <a:prstGeom prst="rect">
@@ -5151,9 +5155,9 @@
           <p:nvPr/>
         </p:nvCxnSpPr>
         <p:spPr>
-          <a:xfrm flipV="1">
-            <a:off x="5741569" y="1928867"/>
-            <a:ext cx="1174004" cy="3542"/>
+          <a:xfrm>
+            <a:off x="6564202" y="2297397"/>
+            <a:ext cx="533985" cy="0"/>
           </a:xfrm>
           <a:prstGeom prst="straightConnector1">
             <a:avLst/>
@@ -5191,13 +5195,14 @@
           </p:cNvPr>
           <p:cNvCxnSpPr>
             <a:cxnSpLocks/>
+            <a:endCxn id="21" idx="2"/>
           </p:cNvCxnSpPr>
           <p:nvPr/>
         </p:nvCxnSpPr>
         <p:spPr>
           <a:xfrm>
-            <a:off x="5741569" y="2390601"/>
-            <a:ext cx="1968048" cy="0"/>
+            <a:off x="6514404" y="2683861"/>
+            <a:ext cx="1460071" cy="8737"/>
           </a:xfrm>
           <a:prstGeom prst="straightConnector1">
             <a:avLst/>
@@ -5240,7 +5245,7 @@
         </p:nvSpPr>
         <p:spPr>
           <a:xfrm>
-            <a:off x="4307045" y="2337602"/>
+            <a:off x="4717519" y="2588471"/>
             <a:ext cx="925413" cy="215444"/>
           </a:xfrm>
           <a:prstGeom prst="rect">
@@ -5268,6 +5273,144 @@
             <a:r>
               <a:rPr lang="en-US" dirty="0"/>
               <a:t>command</a:t>
+            </a:r>
+          </a:p>
+        </p:txBody>
+      </p:sp>
+      <p:cxnSp>
+        <p:nvCxnSpPr>
+          <p:cNvPr id="42" name="Straight Arrow Connector 41">
+            <a:extLst>
+              <a:ext uri="{FF2B5EF4-FFF2-40B4-BE49-F238E27FC236}">
+                <a16:creationId xmlns:a16="http://schemas.microsoft.com/office/drawing/2014/main" id="{6BD4440F-5B9E-4588-87B7-AF05673FD549}"/>
+              </a:ext>
+            </a:extLst>
+          </p:cNvPr>
+          <p:cNvCxnSpPr>
+            <a:cxnSpLocks/>
+          </p:cNvCxnSpPr>
+          <p:nvPr/>
+        </p:nvCxnSpPr>
+        <p:spPr>
+          <a:xfrm>
+            <a:off x="4146325" y="1787934"/>
+            <a:ext cx="2224592" cy="0"/>
+          </a:xfrm>
+          <a:prstGeom prst="straightConnector1">
+            <a:avLst/>
+          </a:prstGeom>
+          <a:ln w="19050">
+            <a:solidFill>
+              <a:srgbClr val="0070C0"/>
+            </a:solidFill>
+            <a:prstDash val="sysDash"/>
+            <a:headEnd type="arrow" w="med" len="med"/>
+            <a:tailEnd type="none" w="med" len="med"/>
+          </a:ln>
+        </p:spPr>
+        <p:style>
+          <a:lnRef idx="1">
+            <a:schemeClr val="accent1"/>
+          </a:lnRef>
+          <a:fillRef idx="0">
+            <a:schemeClr val="accent1"/>
+          </a:fillRef>
+          <a:effectRef idx="0">
+            <a:schemeClr val="accent1"/>
+          </a:effectRef>
+          <a:fontRef idx="minor">
+            <a:schemeClr val="tx1"/>
+          </a:fontRef>
+        </p:style>
+      </p:cxnSp>
+      <p:cxnSp>
+        <p:nvCxnSpPr>
+          <p:cNvPr id="52" name="Straight Arrow Connector 51">
+            <a:extLst>
+              <a:ext uri="{FF2B5EF4-FFF2-40B4-BE49-F238E27FC236}">
+                <a16:creationId xmlns:a16="http://schemas.microsoft.com/office/drawing/2014/main" id="{70D910E8-58EA-4057-AABD-2795205D8C09}"/>
+              </a:ext>
+            </a:extLst>
+          </p:cNvPr>
+          <p:cNvCxnSpPr>
+            <a:cxnSpLocks/>
+            <a:stCxn id="18" idx="3"/>
+          </p:cNvCxnSpPr>
+          <p:nvPr/>
+        </p:nvCxnSpPr>
+        <p:spPr>
+          <a:xfrm>
+            <a:off x="4139186" y="2160953"/>
+            <a:ext cx="2229998" cy="10343"/>
+          </a:xfrm>
+          <a:prstGeom prst="straightConnector1">
+            <a:avLst/>
+          </a:prstGeom>
+          <a:ln w="19050">
+            <a:solidFill>
+              <a:srgbClr val="0070C0"/>
+            </a:solidFill>
+            <a:tailEnd type="arrow"/>
+          </a:ln>
+        </p:spPr>
+        <p:style>
+          <a:lnRef idx="1">
+            <a:schemeClr val="accent1"/>
+          </a:lnRef>
+          <a:fillRef idx="0">
+            <a:schemeClr val="accent1"/>
+          </a:fillRef>
+          <a:effectRef idx="0">
+            <a:schemeClr val="accent1"/>
+          </a:effectRef>
+          <a:fontRef idx="minor">
+            <a:schemeClr val="tx1"/>
+          </a:fontRef>
+        </p:style>
+      </p:cxnSp>
+      <p:sp>
+        <p:nvSpPr>
+          <p:cNvPr id="54" name="TextBox 53">
+            <a:extLst>
+              <a:ext uri="{FF2B5EF4-FFF2-40B4-BE49-F238E27FC236}">
+                <a16:creationId xmlns:a16="http://schemas.microsoft.com/office/drawing/2014/main" id="{928E5F55-AB13-400C-94C3-D904BBD1EE9E}"/>
+              </a:ext>
+            </a:extLst>
+          </p:cNvPr>
+          <p:cNvSpPr txBox="1"/>
+          <p:nvPr/>
+        </p:nvSpPr>
+        <p:spPr>
+          <a:xfrm>
+            <a:off x="4097094" y="1917965"/>
+            <a:ext cx="2278661" cy="215444"/>
+          </a:xfrm>
+          <a:prstGeom prst="rect">
+            <a:avLst/>
+          </a:prstGeom>
+          <a:noFill/>
+        </p:spPr>
+        <p:txBody>
+          <a:bodyPr wrap="square" lIns="0" tIns="0" rIns="0" bIns="0" rtlCol="0">
+            <a:spAutoFit/>
+          </a:bodyPr>
+          <a:lstStyle>
+            <a:defPPr>
+              <a:defRPr lang="en-US"/>
+            </a:defPPr>
+            <a:lvl1pPr algn="r">
+              <a:defRPr sz="1400">
+                <a:solidFill>
+                  <a:srgbClr val="0070C0"/>
+                </a:solidFill>
+              </a:defRPr>
+            </a:lvl1pPr>
+          </a:lstStyle>
+          <a:p>
+            <a:pPr algn="ctr"/>
+            <a:r>
+              <a:rPr lang="en-US" dirty="0"/>
+              <a:t>parse(“Apollo userstory 1”)</a:t>
             </a:r>
           </a:p>
         </p:txBody>

</xml_diff>